<commit_message>
updated linreg line GA
</commit_message>
<xml_diff>
--- a/GA/United States Interest Rates and Property Market_GA.pptx
+++ b/GA/United States Interest Rates and Property Market_GA.pptx
@@ -19,13 +19,14 @@
     <p:sldId id="268" r:id="rId13"/>
     <p:sldId id="260" r:id="rId14"/>
     <p:sldId id="269" r:id="rId15"/>
-    <p:sldId id="270" r:id="rId16"/>
-    <p:sldId id="271" r:id="rId17"/>
-    <p:sldId id="272" r:id="rId18"/>
-    <p:sldId id="274" r:id="rId19"/>
-    <p:sldId id="275" r:id="rId20"/>
-    <p:sldId id="276" r:id="rId21"/>
-    <p:sldId id="277" r:id="rId22"/>
+    <p:sldId id="278" r:id="rId16"/>
+    <p:sldId id="270" r:id="rId17"/>
+    <p:sldId id="271" r:id="rId18"/>
+    <p:sldId id="272" r:id="rId19"/>
+    <p:sldId id="274" r:id="rId20"/>
+    <p:sldId id="275" r:id="rId21"/>
+    <p:sldId id="276" r:id="rId22"/>
+    <p:sldId id="277" r:id="rId23"/>
   </p:sldIdLst>
   <p:sldSz cx="12192000" cy="6858000"/>
   <p:notesSz cx="6858000" cy="9144000"/>
@@ -4471,6 +4472,116 @@
           <p:cNvPr id="2" name="Title 1">
             <a:extLst>
               <a:ext uri="{FF2B5EF4-FFF2-40B4-BE49-F238E27FC236}">
+                <a16:creationId xmlns:a16="http://schemas.microsoft.com/office/drawing/2014/main" id="{B7F7EF98-D84B-9508-7768-D5EC270EE943}"/>
+              </a:ext>
+            </a:extLst>
+          </p:cNvPr>
+          <p:cNvSpPr>
+            <a:spLocks noGrp="1"/>
+          </p:cNvSpPr>
+          <p:nvPr>
+            <p:ph type="title"/>
+          </p:nvPr>
+        </p:nvSpPr>
+        <p:spPr/>
+        <p:txBody>
+          <a:bodyPr/>
+          <a:lstStyle/>
+          <a:p>
+            <a:endParaRPr lang="en-AU"/>
+          </a:p>
+        </p:txBody>
+      </p:sp>
+      <p:sp>
+        <p:nvSpPr>
+          <p:cNvPr id="3" name="Content Placeholder 2">
+            <a:extLst>
+              <a:ext uri="{FF2B5EF4-FFF2-40B4-BE49-F238E27FC236}">
+                <a16:creationId xmlns:a16="http://schemas.microsoft.com/office/drawing/2014/main" id="{6045A967-12A2-692E-4E15-0169C7DA6481}"/>
+              </a:ext>
+            </a:extLst>
+          </p:cNvPr>
+          <p:cNvSpPr>
+            <a:spLocks noGrp="1"/>
+          </p:cNvSpPr>
+          <p:nvPr>
+            <p:ph idx="1"/>
+          </p:nvPr>
+        </p:nvSpPr>
+        <p:spPr/>
+        <p:txBody>
+          <a:bodyPr/>
+          <a:lstStyle/>
+          <a:p>
+            <a:endParaRPr lang="en-AU" dirty="0"/>
+          </a:p>
+        </p:txBody>
+      </p:sp>
+      <p:pic>
+        <p:nvPicPr>
+          <p:cNvPr id="5" name="Picture 4">
+            <a:extLst>
+              <a:ext uri="{FF2B5EF4-FFF2-40B4-BE49-F238E27FC236}">
+                <a16:creationId xmlns:a16="http://schemas.microsoft.com/office/drawing/2014/main" id="{190B387D-C85E-82C3-6C27-25A7602EBC3C}"/>
+              </a:ext>
+            </a:extLst>
+          </p:cNvPr>
+          <p:cNvPicPr>
+            <a:picLocks noChangeAspect="1"/>
+          </p:cNvPicPr>
+          <p:nvPr/>
+        </p:nvPicPr>
+        <p:blipFill>
+          <a:blip r:embed="rId2"/>
+          <a:stretch>
+            <a:fillRect/>
+          </a:stretch>
+        </p:blipFill>
+        <p:spPr>
+          <a:xfrm>
+            <a:off x="0" y="0"/>
+            <a:ext cx="12192000" cy="6858000"/>
+          </a:xfrm>
+          <a:prstGeom prst="rect">
+            <a:avLst/>
+          </a:prstGeom>
+        </p:spPr>
+      </p:pic>
+    </p:spTree>
+    <p:extLst>
+      <p:ext uri="{BB962C8B-B14F-4D97-AF65-F5344CB8AC3E}">
+        <p14:creationId xmlns:p14="http://schemas.microsoft.com/office/powerpoint/2010/main" val="1629588413"/>
+      </p:ext>
+    </p:extLst>
+  </p:cSld>
+  <p:clrMapOvr>
+    <a:masterClrMapping/>
+  </p:clrMapOvr>
+</p:sld>
+</file>
+
+<file path=ppt/slides/slide16.xml><?xml version="1.0" encoding="utf-8"?>
+<p:sld xmlns:a="http://schemas.openxmlformats.org/drawingml/2006/main" xmlns:r="http://schemas.openxmlformats.org/officeDocument/2006/relationships" xmlns:p="http://schemas.openxmlformats.org/presentationml/2006/main">
+  <p:cSld>
+    <p:spTree>
+      <p:nvGrpSpPr>
+        <p:cNvPr id="1" name=""/>
+        <p:cNvGrpSpPr/>
+        <p:nvPr/>
+      </p:nvGrpSpPr>
+      <p:grpSpPr>
+        <a:xfrm>
+          <a:off x="0" y="0"/>
+          <a:ext cx="0" cy="0"/>
+          <a:chOff x="0" y="0"/>
+          <a:chExt cx="0" cy="0"/>
+        </a:xfrm>
+      </p:grpSpPr>
+      <p:sp>
+        <p:nvSpPr>
+          <p:cNvPr id="2" name="Title 1">
+            <a:extLst>
+              <a:ext uri="{FF2B5EF4-FFF2-40B4-BE49-F238E27FC236}">
                 <a16:creationId xmlns:a16="http://schemas.microsoft.com/office/drawing/2014/main" id="{7A3E5367-52F5-B972-E767-E5D11E4DB81A}"/>
               </a:ext>
             </a:extLst>
@@ -4719,147 +4830,6 @@
 </p:sld>
 </file>
 
-<file path=ppt/slides/slide16.xml><?xml version="1.0" encoding="utf-8"?>
-<p:sld xmlns:a="http://schemas.openxmlformats.org/drawingml/2006/main" xmlns:r="http://schemas.openxmlformats.org/officeDocument/2006/relationships" xmlns:p="http://schemas.openxmlformats.org/presentationml/2006/main">
-  <p:cSld>
-    <p:spTree>
-      <p:nvGrpSpPr>
-        <p:cNvPr id="1" name=""/>
-        <p:cNvGrpSpPr/>
-        <p:nvPr/>
-      </p:nvGrpSpPr>
-      <p:grpSpPr>
-        <a:xfrm>
-          <a:off x="0" y="0"/>
-          <a:ext cx="0" cy="0"/>
-          <a:chOff x="0" y="0"/>
-          <a:chExt cx="0" cy="0"/>
-        </a:xfrm>
-      </p:grpSpPr>
-      <p:sp>
-        <p:nvSpPr>
-          <p:cNvPr id="2" name="Title 1">
-            <a:extLst>
-              <a:ext uri="{FF2B5EF4-FFF2-40B4-BE49-F238E27FC236}">
-                <a16:creationId xmlns:a16="http://schemas.microsoft.com/office/drawing/2014/main" id="{4742752D-6BBF-0DC4-4961-8FB82EFC41D7}"/>
-              </a:ext>
-            </a:extLst>
-          </p:cNvPr>
-          <p:cNvSpPr>
-            <a:spLocks noGrp="1"/>
-          </p:cNvSpPr>
-          <p:nvPr>
-            <p:ph type="title"/>
-          </p:nvPr>
-        </p:nvSpPr>
-        <p:spPr>
-          <a:xfrm>
-            <a:off x="104775" y="7143"/>
-            <a:ext cx="11982450" cy="878682"/>
-          </a:xfrm>
-        </p:spPr>
-        <p:txBody>
-          <a:bodyPr>
-            <a:normAutofit/>
-          </a:bodyPr>
-          <a:lstStyle/>
-          <a:p>
-            <a:r>
-              <a:rPr lang="en-US" sz="3500" b="1" i="0" dirty="0">
-                <a:effectLst/>
-                <a:latin typeface="Söhne"/>
-              </a:rPr>
-              <a:t>BIS Real Property Price Index for the United States and Australia</a:t>
-            </a:r>
-            <a:endParaRPr lang="en-AU" sz="3500" dirty="0"/>
-          </a:p>
-        </p:txBody>
-      </p:sp>
-      <p:pic>
-        <p:nvPicPr>
-          <p:cNvPr id="5" name="Picture 4">
-            <a:extLst>
-              <a:ext uri="{FF2B5EF4-FFF2-40B4-BE49-F238E27FC236}">
-                <a16:creationId xmlns:a16="http://schemas.microsoft.com/office/drawing/2014/main" id="{24397585-97F6-74B8-6360-611508907CA7}"/>
-              </a:ext>
-            </a:extLst>
-          </p:cNvPr>
-          <p:cNvPicPr>
-            <a:picLocks noChangeAspect="1"/>
-          </p:cNvPicPr>
-          <p:nvPr/>
-        </p:nvPicPr>
-        <p:blipFill>
-          <a:blip r:embed="rId2"/>
-          <a:stretch>
-            <a:fillRect/>
-          </a:stretch>
-        </p:blipFill>
-        <p:spPr>
-          <a:xfrm>
-            <a:off x="0" y="752475"/>
-            <a:ext cx="6095999" cy="6105525"/>
-          </a:xfrm>
-          <a:prstGeom prst="rect">
-            <a:avLst/>
-          </a:prstGeom>
-        </p:spPr>
-      </p:pic>
-      <p:sp>
-        <p:nvSpPr>
-          <p:cNvPr id="6" name="Content Placeholder 2">
-            <a:extLst>
-              <a:ext uri="{FF2B5EF4-FFF2-40B4-BE49-F238E27FC236}">
-                <a16:creationId xmlns:a16="http://schemas.microsoft.com/office/drawing/2014/main" id="{6384CF03-8AE3-1590-B724-4AA816F45671}"/>
-              </a:ext>
-            </a:extLst>
-          </p:cNvPr>
-          <p:cNvSpPr>
-            <a:spLocks noGrp="1"/>
-          </p:cNvSpPr>
-          <p:nvPr>
-            <p:ph idx="1"/>
-          </p:nvPr>
-        </p:nvSpPr>
-        <p:spPr>
-          <a:xfrm>
-            <a:off x="6429375" y="1290637"/>
-            <a:ext cx="5657850" cy="5029199"/>
-          </a:xfrm>
-        </p:spPr>
-        <p:txBody>
-          <a:bodyPr>
-            <a:normAutofit/>
-          </a:bodyPr>
-          <a:lstStyle/>
-          <a:p>
-            <a:r>
-              <a:rPr lang="en-US" b="0" i="0" dirty="0">
-                <a:solidFill>
-                  <a:srgbClr val="343541"/>
-                </a:solidFill>
-                <a:effectLst/>
-                <a:latin typeface="Söhne"/>
-              </a:rPr>
-              <a:t>United States: The interest rates in the United States have been relatively higher than in Australia over the entire period, with a range from 0.125% to 5.375%. The Real Property Price Index for the United States has generally increased over the years.</a:t>
-            </a:r>
-            <a:endParaRPr lang="en-AU" dirty="0"/>
-          </a:p>
-        </p:txBody>
-      </p:sp>
-    </p:spTree>
-    <p:extLst>
-      <p:ext uri="{BB962C8B-B14F-4D97-AF65-F5344CB8AC3E}">
-        <p14:creationId xmlns:p14="http://schemas.microsoft.com/office/powerpoint/2010/main" val="2285147446"/>
-      </p:ext>
-    </p:extLst>
-  </p:cSld>
-  <p:clrMapOvr>
-    <a:masterClrMapping/>
-  </p:clrMapOvr>
-</p:sld>
-</file>
-
 <file path=ppt/slides/slide17.xml><?xml version="1.0" encoding="utf-8"?>
 <p:sld xmlns:a="http://schemas.openxmlformats.org/drawingml/2006/main" xmlns:r="http://schemas.openxmlformats.org/officeDocument/2006/relationships" xmlns:p="http://schemas.openxmlformats.org/presentationml/2006/main">
   <p:cSld>
@@ -4970,7 +4940,7 @@
         </p:spPr>
         <p:txBody>
           <a:bodyPr>
-            <a:normAutofit lnSpcReduction="10000"/>
+            <a:normAutofit/>
           </a:bodyPr>
           <a:lstStyle/>
           <a:p>
@@ -4982,31 +4952,7 @@
                 <a:effectLst/>
                 <a:latin typeface="Söhne"/>
               </a:rPr>
-              <a:t>United States: The interest rates in the United States have been relatively higher than in Australia over the entire period, with a range from 0.125% to 5.375%. </a:t>
-            </a:r>
-          </a:p>
-          <a:p>
-            <a:r>
-              <a:rPr lang="en-US" b="0" i="0" dirty="0">
-                <a:solidFill>
-                  <a:srgbClr val="343541"/>
-                </a:solidFill>
-                <a:effectLst/>
-                <a:latin typeface="Söhne"/>
-              </a:rPr>
-              <a:t>The Real Property Price Index for the United States has generally increased over the years. It started around 101 in 2010 and reached approximately 157 in 06-2023.</a:t>
-            </a:r>
-          </a:p>
-          <a:p>
-            <a:r>
-              <a:rPr lang="en-US" b="0" i="0" dirty="0">
-                <a:solidFill>
-                  <a:srgbClr val="343541"/>
-                </a:solidFill>
-                <a:effectLst/>
-                <a:latin typeface="Söhne"/>
-              </a:rPr>
-              <a:t>In index terms, it would mean that the same property around 2010 is now 50% more in value. </a:t>
+              <a:t>United States: The interest rates in the United States have been relatively higher than in Australia over the entire period, with a range from 0.125% to 5.375%. The Real Property Price Index for the United States has generally increased over the years.</a:t>
             </a:r>
             <a:endParaRPr lang="en-AU" dirty="0"/>
           </a:p>
@@ -5015,7 +4961,7 @@
     </p:spTree>
     <p:extLst>
       <p:ext uri="{BB962C8B-B14F-4D97-AF65-F5344CB8AC3E}">
-        <p14:creationId xmlns:p14="http://schemas.microsoft.com/office/powerpoint/2010/main" val="3033862339"/>
+        <p14:creationId xmlns:p14="http://schemas.microsoft.com/office/powerpoint/2010/main" val="2285147446"/>
       </p:ext>
     </p:extLst>
   </p:cSld>
@@ -5104,7 +5050,7 @@
         <p:spPr>
           <a:xfrm>
             <a:off x="0" y="752475"/>
-            <a:ext cx="6095999" cy="2676525"/>
+            <a:ext cx="6095999" cy="6105525"/>
           </a:xfrm>
           <a:prstGeom prst="rect">
             <a:avLst/>
@@ -5135,7 +5081,7 @@
         </p:spPr>
         <p:txBody>
           <a:bodyPr>
-            <a:normAutofit/>
+            <a:normAutofit lnSpcReduction="10000"/>
           </a:bodyPr>
           <a:lstStyle/>
           <a:p>
@@ -5147,49 +5093,40 @@
                 <a:effectLst/>
                 <a:latin typeface="Söhne"/>
               </a:rPr>
-              <a:t>Furthermore, Zillow's SRAM indicator, which measures the Median Sale Price (Raw, All Homes, Monthly), supports these observations wherein the price from 2010 has almost doubled in 2023. </a:t>
-            </a:r>
-            <a:br>
-              <a:rPr lang="en-US" dirty="0"/>
-            </a:br>
+              <a:t>United States: The interest rates in the United States have been relatively higher than in Australia over the entire period, with a range from 0.125% to 5.375%. </a:t>
+            </a:r>
+          </a:p>
+          <a:p>
+            <a:r>
+              <a:rPr lang="en-US" b="0" i="0" dirty="0">
+                <a:solidFill>
+                  <a:srgbClr val="343541"/>
+                </a:solidFill>
+                <a:effectLst/>
+                <a:latin typeface="Söhne"/>
+              </a:rPr>
+              <a:t>The Real Property Price Index for the United States has generally increased over the years. It started around 101 in 2010 and reached approximately 157 in 06-2023.</a:t>
+            </a:r>
+          </a:p>
+          <a:p>
+            <a:r>
+              <a:rPr lang="en-US" b="0" i="0" dirty="0">
+                <a:solidFill>
+                  <a:srgbClr val="343541"/>
+                </a:solidFill>
+                <a:effectLst/>
+                <a:latin typeface="Söhne"/>
+              </a:rPr>
+              <a:t>In index terms, it would mean that the same property around 2010 is now 50% more in value. </a:t>
+            </a:r>
             <a:endParaRPr lang="en-AU" dirty="0"/>
           </a:p>
         </p:txBody>
       </p:sp>
-      <p:pic>
-        <p:nvPicPr>
-          <p:cNvPr id="3" name="Picture 2">
-            <a:extLst>
-              <a:ext uri="{FF2B5EF4-FFF2-40B4-BE49-F238E27FC236}">
-                <a16:creationId xmlns:a16="http://schemas.microsoft.com/office/drawing/2014/main" id="{CBEEC9CE-1365-9AD7-E762-F16BBFCDBB4B}"/>
-              </a:ext>
-            </a:extLst>
-          </p:cNvPr>
-          <p:cNvPicPr>
-            <a:picLocks noChangeAspect="1"/>
-          </p:cNvPicPr>
-          <p:nvPr/>
-        </p:nvPicPr>
-        <p:blipFill>
-          <a:blip r:embed="rId3"/>
-          <a:stretch>
-            <a:fillRect/>
-          </a:stretch>
-        </p:blipFill>
-        <p:spPr>
-          <a:xfrm>
-            <a:off x="0" y="3429000"/>
-            <a:ext cx="6096001" cy="3429000"/>
-          </a:xfrm>
-          <a:prstGeom prst="rect">
-            <a:avLst/>
-          </a:prstGeom>
-        </p:spPr>
-      </p:pic>
     </p:spTree>
     <p:extLst>
       <p:ext uri="{BB962C8B-B14F-4D97-AF65-F5344CB8AC3E}">
-        <p14:creationId xmlns:p14="http://schemas.microsoft.com/office/powerpoint/2010/main" val="3157333371"/>
+        <p14:creationId xmlns:p14="http://schemas.microsoft.com/office/powerpoint/2010/main" val="3033862339"/>
       </p:ext>
     </p:extLst>
   </p:cSld>
@@ -5245,14 +5182,13 @@
           <a:lstStyle/>
           <a:p>
             <a:r>
-              <a:rPr lang="en-US" sz="3600" b="1" dirty="0">
+              <a:rPr lang="en-US" sz="3500" b="1" i="0" dirty="0">
+                <a:effectLst/>
                 <a:latin typeface="Söhne"/>
               </a:rPr>
-              <a:t>How does it compare to the Australian Market?</a:t>
-            </a:r>
-            <a:endParaRPr lang="en-AU" sz="3500" b="1" dirty="0">
-              <a:latin typeface="Söhne"/>
-            </a:endParaRPr>
+              <a:t>BIS Real Property Price Index for the United States and Australia</a:t>
+            </a:r>
+            <a:endParaRPr lang="en-AU" sz="3500" dirty="0"/>
           </a:p>
         </p:txBody>
       </p:sp>
@@ -5279,7 +5215,7 @@
         <p:spPr>
           <a:xfrm>
             <a:off x="0" y="752475"/>
-            <a:ext cx="6095999" cy="6105525"/>
+            <a:ext cx="6095999" cy="2676525"/>
           </a:xfrm>
           <a:prstGeom prst="rect">
             <a:avLst/>
@@ -5310,7 +5246,7 @@
         </p:spPr>
         <p:txBody>
           <a:bodyPr>
-            <a:normAutofit fontScale="92500" lnSpcReduction="10000"/>
+            <a:normAutofit/>
           </a:bodyPr>
           <a:lstStyle/>
           <a:p>
@@ -5322,40 +5258,49 @@
                 <a:effectLst/>
                 <a:latin typeface="Söhne"/>
               </a:rPr>
-              <a:t>Australia: The interest rates in Australia also saw variation during the period but remained generally lower than in the United States, with a range from 0.125% to 4.10%.</a:t>
-            </a:r>
-          </a:p>
-          <a:p>
-            <a:r>
-              <a:rPr lang="en-US" b="0" i="0" dirty="0">
-                <a:solidFill>
-                  <a:srgbClr val="343541"/>
-                </a:solidFill>
-                <a:effectLst/>
-                <a:latin typeface="Söhne"/>
-              </a:rPr>
-              <a:t>The Real Property Price Index in Australia increased over the years, indicating a general upward trend in property prices. It started around 99 in 2010 and reached approximately 122 in 03-2023.</a:t>
-            </a:r>
-          </a:p>
-          <a:p>
-            <a:r>
-              <a:rPr lang="en-US" b="0" i="0" dirty="0">
-                <a:solidFill>
-                  <a:srgbClr val="343541"/>
-                </a:solidFill>
-                <a:effectLst/>
-                <a:latin typeface="Söhne"/>
-              </a:rPr>
-              <a:t>In index terms, it would mean that the same property around 2010 is now 22% more in value.</a:t>
-            </a:r>
+              <a:t>Furthermore, Zillow's SRAM indicator, which measures the Median Sale Price (Raw, All Homes, Monthly), supports these observations wherein the price from 2010 has almost doubled in 2023. </a:t>
+            </a:r>
+            <a:br>
+              <a:rPr lang="en-US" dirty="0"/>
+            </a:br>
             <a:endParaRPr lang="en-AU" dirty="0"/>
           </a:p>
         </p:txBody>
       </p:sp>
+      <p:pic>
+        <p:nvPicPr>
+          <p:cNvPr id="3" name="Picture 2">
+            <a:extLst>
+              <a:ext uri="{FF2B5EF4-FFF2-40B4-BE49-F238E27FC236}">
+                <a16:creationId xmlns:a16="http://schemas.microsoft.com/office/drawing/2014/main" id="{CBEEC9CE-1365-9AD7-E762-F16BBFCDBB4B}"/>
+              </a:ext>
+            </a:extLst>
+          </p:cNvPr>
+          <p:cNvPicPr>
+            <a:picLocks noChangeAspect="1"/>
+          </p:cNvPicPr>
+          <p:nvPr/>
+        </p:nvPicPr>
+        <p:blipFill>
+          <a:blip r:embed="rId3"/>
+          <a:stretch>
+            <a:fillRect/>
+          </a:stretch>
+        </p:blipFill>
+        <p:spPr>
+          <a:xfrm>
+            <a:off x="0" y="3429000"/>
+            <a:ext cx="6096001" cy="3429000"/>
+          </a:xfrm>
+          <a:prstGeom prst="rect">
+            <a:avLst/>
+          </a:prstGeom>
+        </p:spPr>
+      </p:pic>
     </p:spTree>
     <p:extLst>
       <p:ext uri="{BB962C8B-B14F-4D97-AF65-F5344CB8AC3E}">
-        <p14:creationId xmlns:p14="http://schemas.microsoft.com/office/powerpoint/2010/main" val="1644076619"/>
+        <p14:creationId xmlns:p14="http://schemas.microsoft.com/office/powerpoint/2010/main" val="3157333371"/>
       </p:ext>
     </p:extLst>
   </p:cSld>
@@ -5609,6 +5554,172 @@
         </p:nvSpPr>
         <p:spPr>
           <a:xfrm>
+            <a:off x="104775" y="7143"/>
+            <a:ext cx="11982450" cy="878682"/>
+          </a:xfrm>
+        </p:spPr>
+        <p:txBody>
+          <a:bodyPr>
+            <a:normAutofit/>
+          </a:bodyPr>
+          <a:lstStyle/>
+          <a:p>
+            <a:r>
+              <a:rPr lang="en-US" sz="3600" b="1" dirty="0">
+                <a:latin typeface="Söhne"/>
+              </a:rPr>
+              <a:t>How does it compare to the Australian Market?</a:t>
+            </a:r>
+            <a:endParaRPr lang="en-AU" sz="3500" b="1" dirty="0">
+              <a:latin typeface="Söhne"/>
+            </a:endParaRPr>
+          </a:p>
+        </p:txBody>
+      </p:sp>
+      <p:pic>
+        <p:nvPicPr>
+          <p:cNvPr id="5" name="Picture 4">
+            <a:extLst>
+              <a:ext uri="{FF2B5EF4-FFF2-40B4-BE49-F238E27FC236}">
+                <a16:creationId xmlns:a16="http://schemas.microsoft.com/office/drawing/2014/main" id="{24397585-97F6-74B8-6360-611508907CA7}"/>
+              </a:ext>
+            </a:extLst>
+          </p:cNvPr>
+          <p:cNvPicPr>
+            <a:picLocks noChangeAspect="1"/>
+          </p:cNvPicPr>
+          <p:nvPr/>
+        </p:nvPicPr>
+        <p:blipFill>
+          <a:blip r:embed="rId2"/>
+          <a:stretch>
+            <a:fillRect/>
+          </a:stretch>
+        </p:blipFill>
+        <p:spPr>
+          <a:xfrm>
+            <a:off x="0" y="752475"/>
+            <a:ext cx="6095999" cy="6105525"/>
+          </a:xfrm>
+          <a:prstGeom prst="rect">
+            <a:avLst/>
+          </a:prstGeom>
+        </p:spPr>
+      </p:pic>
+      <p:sp>
+        <p:nvSpPr>
+          <p:cNvPr id="6" name="Content Placeholder 2">
+            <a:extLst>
+              <a:ext uri="{FF2B5EF4-FFF2-40B4-BE49-F238E27FC236}">
+                <a16:creationId xmlns:a16="http://schemas.microsoft.com/office/drawing/2014/main" id="{6384CF03-8AE3-1590-B724-4AA816F45671}"/>
+              </a:ext>
+            </a:extLst>
+          </p:cNvPr>
+          <p:cNvSpPr>
+            <a:spLocks noGrp="1"/>
+          </p:cNvSpPr>
+          <p:nvPr>
+            <p:ph idx="1"/>
+          </p:nvPr>
+        </p:nvSpPr>
+        <p:spPr>
+          <a:xfrm>
+            <a:off x="6429375" y="1290637"/>
+            <a:ext cx="5657850" cy="5029199"/>
+          </a:xfrm>
+        </p:spPr>
+        <p:txBody>
+          <a:bodyPr>
+            <a:normAutofit fontScale="92500" lnSpcReduction="10000"/>
+          </a:bodyPr>
+          <a:lstStyle/>
+          <a:p>
+            <a:r>
+              <a:rPr lang="en-US" b="0" i="0" dirty="0">
+                <a:solidFill>
+                  <a:srgbClr val="343541"/>
+                </a:solidFill>
+                <a:effectLst/>
+                <a:latin typeface="Söhne"/>
+              </a:rPr>
+              <a:t>Australia: The interest rates in Australia also saw variation during the period but remained generally lower than in the United States, with a range from 0.125% to 4.10%.</a:t>
+            </a:r>
+          </a:p>
+          <a:p>
+            <a:r>
+              <a:rPr lang="en-US" b="0" i="0" dirty="0">
+                <a:solidFill>
+                  <a:srgbClr val="343541"/>
+                </a:solidFill>
+                <a:effectLst/>
+                <a:latin typeface="Söhne"/>
+              </a:rPr>
+              <a:t>The Real Property Price Index in Australia increased over the years, indicating a general upward trend in property prices. It started around 99 in 2010 and reached approximately 122 in 03-2023.</a:t>
+            </a:r>
+          </a:p>
+          <a:p>
+            <a:r>
+              <a:rPr lang="en-US" b="0" i="0" dirty="0">
+                <a:solidFill>
+                  <a:srgbClr val="343541"/>
+                </a:solidFill>
+                <a:effectLst/>
+                <a:latin typeface="Söhne"/>
+              </a:rPr>
+              <a:t>In index terms, it would mean that the same property around 2010 is now 22% more in value.</a:t>
+            </a:r>
+            <a:endParaRPr lang="en-AU" dirty="0"/>
+          </a:p>
+        </p:txBody>
+      </p:sp>
+    </p:spTree>
+    <p:extLst>
+      <p:ext uri="{BB962C8B-B14F-4D97-AF65-F5344CB8AC3E}">
+        <p14:creationId xmlns:p14="http://schemas.microsoft.com/office/powerpoint/2010/main" val="1644076619"/>
+      </p:ext>
+    </p:extLst>
+  </p:cSld>
+  <p:clrMapOvr>
+    <a:masterClrMapping/>
+  </p:clrMapOvr>
+</p:sld>
+</file>
+
+<file path=ppt/slides/slide21.xml><?xml version="1.0" encoding="utf-8"?>
+<p:sld xmlns:a="http://schemas.openxmlformats.org/drawingml/2006/main" xmlns:r="http://schemas.openxmlformats.org/officeDocument/2006/relationships" xmlns:p="http://schemas.openxmlformats.org/presentationml/2006/main">
+  <p:cSld>
+    <p:spTree>
+      <p:nvGrpSpPr>
+        <p:cNvPr id="1" name=""/>
+        <p:cNvGrpSpPr/>
+        <p:nvPr/>
+      </p:nvGrpSpPr>
+      <p:grpSpPr>
+        <a:xfrm>
+          <a:off x="0" y="0"/>
+          <a:ext cx="0" cy="0"/>
+          <a:chOff x="0" y="0"/>
+          <a:chExt cx="0" cy="0"/>
+        </a:xfrm>
+      </p:grpSpPr>
+      <p:sp>
+        <p:nvSpPr>
+          <p:cNvPr id="2" name="Title 1">
+            <a:extLst>
+              <a:ext uri="{FF2B5EF4-FFF2-40B4-BE49-F238E27FC236}">
+                <a16:creationId xmlns:a16="http://schemas.microsoft.com/office/drawing/2014/main" id="{4742752D-6BBF-0DC4-4961-8FB82EFC41D7}"/>
+              </a:ext>
+            </a:extLst>
+          </p:cNvPr>
+          <p:cNvSpPr>
+            <a:spLocks noGrp="1"/>
+          </p:cNvSpPr>
+          <p:nvPr>
+            <p:ph type="title"/>
+          </p:nvPr>
+        </p:nvSpPr>
+        <p:spPr>
+          <a:xfrm>
             <a:off x="104775" y="226218"/>
             <a:ext cx="11982450" cy="878682"/>
           </a:xfrm>
@@ -6001,7 +6112,7 @@
 </p:sld>
 </file>
 
-<file path=ppt/slides/slide21.xml><?xml version="1.0" encoding="utf-8"?>
+<file path=ppt/slides/slide22.xml><?xml version="1.0" encoding="utf-8"?>
 <p:sld xmlns:a="http://schemas.openxmlformats.org/drawingml/2006/main" xmlns:r="http://schemas.openxmlformats.org/officeDocument/2006/relationships" xmlns:p="http://schemas.openxmlformats.org/presentationml/2006/main">
   <p:cSld>
     <p:spTree>

</xml_diff>